<commit_message>
added slide about what 'Enterprise Grade' means today
</commit_message>
<xml_diff>
--- a/Presentation.pptx
+++ b/Presentation.pptx
@@ -1040,6 +1040,15 @@
           </a:p>
           <a:p>
             <a:r>
+              <a:rPr lang="en-US" dirty="0"/>
+              <a:t>This list was given to be by a mentor in the late 90’s.  It represented his take on what “Enterprise Grade Software” meant.  Was it hard to crash?  Did it fail elegantly?  Did failures cascade to other systems?  What the code legible… even (dare I say) beautiful?  These are the first things in my career I was taught to hold dear.</a:t>
+            </a:r>
+          </a:p>
+          <a:p>
+            <a:endParaRPr lang="en-US" dirty="0"/>
+          </a:p>
+          <a:p>
+            <a:r>
               <a:rPr lang="en-US" b="1" dirty="0"/>
               <a:t>These are all important</a:t>
             </a:r>
@@ -1112,6 +1121,307 @@
     <p:extLst>
       <p:ext uri="{BB962C8B-B14F-4D97-AF65-F5344CB8AC3E}">
         <p14:creationId xmlns:p14="http://schemas.microsoft.com/office/powerpoint/2010/main" val="2812715017"/>
+      </p:ext>
+    </p:extLst>
+  </p:cSld>
+  <p:clrMapOvr>
+    <a:masterClrMapping/>
+  </p:clrMapOvr>
+</p:notes>
+</file>
+
+<file path=ppt/notesSlides/notesSlide5.xml><?xml version="1.0" encoding="utf-8"?>
+<p:notes xmlns:a="http://schemas.openxmlformats.org/drawingml/2006/main" xmlns:r="http://schemas.openxmlformats.org/officeDocument/2006/relationships" xmlns:p="http://schemas.openxmlformats.org/presentationml/2006/main">
+  <p:cSld>
+    <p:spTree>
+      <p:nvGrpSpPr>
+        <p:cNvPr id="1" name=""/>
+        <p:cNvGrpSpPr/>
+        <p:nvPr/>
+      </p:nvGrpSpPr>
+      <p:grpSpPr>
+        <a:xfrm>
+          <a:off x="0" y="0"/>
+          <a:ext cx="0" cy="0"/>
+          <a:chOff x="0" y="0"/>
+          <a:chExt cx="0" cy="0"/>
+        </a:xfrm>
+      </p:grpSpPr>
+      <p:sp>
+        <p:nvSpPr>
+          <p:cNvPr id="2" name="Slide Image Placeholder 1"/>
+          <p:cNvSpPr>
+            <a:spLocks noGrp="1" noRot="1" noChangeAspect="1"/>
+          </p:cNvSpPr>
+          <p:nvPr>
+            <p:ph type="sldImg"/>
+          </p:nvPr>
+        </p:nvSpPr>
+        <p:spPr/>
+      </p:sp>
+      <p:sp>
+        <p:nvSpPr>
+          <p:cNvPr id="3" name="Notes Placeholder 2"/>
+          <p:cNvSpPr>
+            <a:spLocks noGrp="1"/>
+          </p:cNvSpPr>
+          <p:nvPr>
+            <p:ph type="body" idx="1"/>
+          </p:nvPr>
+        </p:nvSpPr>
+        <p:spPr/>
+        <p:txBody>
+          <a:bodyPr/>
+          <a:lstStyle/>
+          <a:p>
+            <a:r>
+              <a:rPr lang="en-US" dirty="0"/>
+              <a:t>This slide does not represent a list of things to leave and do today at the expense of all else.  Rather it represents one of many possible desired end states.</a:t>
+            </a:r>
+          </a:p>
+          <a:p>
+            <a:endParaRPr lang="en-US" dirty="0"/>
+          </a:p>
+          <a:p>
+            <a:r>
+              <a:rPr lang="en-US" dirty="0"/>
+              <a:t>We need to participate in a maturation of thinking that aligns with the times and the new solution spaces available to us.  The evolution is from “Enterprise Grade Software” to “Enterprise Grade Solutions.”  This reflects a fundamental shift in how we organize and isolate complexity in providing solutions to complex problems.  It also represents a fundamental shift in how we deal with crosscutting concerns.  Concerns can now be separated not just across code, but across infrastructure, operations, and governance layers.  The goal is to create systems where complexity is contained, solutions are logically organized, and each crosscutting concerns is handled at the ideal layer in the solution stack.</a:t>
+            </a:r>
+          </a:p>
+          <a:p>
+            <a:endParaRPr lang="en-US" dirty="0"/>
+          </a:p>
+          <a:p>
+            <a:r>
+              <a:rPr lang="en-US" b="1" dirty="0"/>
+              <a:t>Fit for purpose</a:t>
+            </a:r>
+            <a:r>
+              <a:rPr lang="en-US" b="0" dirty="0"/>
+              <a:t>:  Above all, you must solve the problem in front of you.  If your system doesn’t do what you need it to do, you might as well pack up and go home.</a:t>
+            </a:r>
+            <a:endParaRPr lang="en-US" b="1" dirty="0"/>
+          </a:p>
+          <a:p>
+            <a:endParaRPr lang="en-US" b="1" dirty="0"/>
+          </a:p>
+          <a:p>
+            <a:r>
+              <a:rPr lang="en-US" b="1" dirty="0"/>
+              <a:t>Security by design</a:t>
+            </a:r>
+            <a:r>
+              <a:rPr lang="en-US" b="0" dirty="0"/>
+              <a:t>:  Security cannot be an afterthought.  This means zero-trust network architecture, encryption everywhere, automated compliance scanning, and embedding security policies within infrastructure as code throughout the development lifecycle.</a:t>
+            </a:r>
+          </a:p>
+          <a:p>
+            <a:pPr marL="171450" indent="-171450">
+              <a:buFont typeface="Arial" panose="020B0604020202020204" pitchFamily="34" charset="0"/>
+              <a:buChar char="•"/>
+            </a:pPr>
+            <a:r>
+              <a:rPr lang="en-US" b="0" dirty="0"/>
+              <a:t>Talk about Cherryl</a:t>
+            </a:r>
+          </a:p>
+          <a:p>
+            <a:pPr marL="171450" indent="-171450">
+              <a:buFont typeface="Arial" panose="020B0604020202020204" pitchFamily="34" charset="0"/>
+              <a:buChar char="•"/>
+            </a:pPr>
+            <a:r>
+              <a:rPr lang="en-US" b="0" dirty="0"/>
+              <a:t>Talk about security and compliance in general</a:t>
+            </a:r>
+          </a:p>
+          <a:p>
+            <a:pPr marL="171450" indent="-171450">
+              <a:buFont typeface="Arial" panose="020B0604020202020204" pitchFamily="34" charset="0"/>
+              <a:buChar char="•"/>
+            </a:pPr>
+            <a:r>
+              <a:rPr lang="en-US" b="0" dirty="0"/>
+              <a:t>Talk about David Pool’s new role</a:t>
+            </a:r>
+          </a:p>
+          <a:p>
+            <a:endParaRPr lang="en-US" b="0" dirty="0"/>
+          </a:p>
+          <a:p>
+            <a:r>
+              <a:rPr lang="en-US" b="1" dirty="0"/>
+              <a:t>Organized design</a:t>
+            </a:r>
+            <a:r>
+              <a:rPr lang="en-US" b="0" dirty="0"/>
+              <a:t>:  </a:t>
+            </a:r>
+          </a:p>
+          <a:p>
+            <a:endParaRPr lang="en-US" b="0" dirty="0"/>
+          </a:p>
+          <a:p>
+            <a:r>
+              <a:rPr lang="en-US" b="1" dirty="0"/>
+              <a:t>Isolation of complexity</a:t>
+            </a:r>
+            <a:r>
+              <a:rPr lang="en-US" b="0" dirty="0"/>
+              <a:t>:  Complexity should be isolated at multiple levels – from microservice boundaries to network segmentation to data access patterns and more.  This means pushing cross-cutting concerns like SSL termination, authentication, and rate limiting to the platform layer through service meshes and API gateways.  It also means keeping business logic focused and pristine.</a:t>
+            </a:r>
+          </a:p>
+          <a:p>
+            <a:endParaRPr lang="en-US" b="0" dirty="0"/>
+          </a:p>
+          <a:p>
+            <a:r>
+              <a:rPr lang="en-US" b="1" dirty="0"/>
+              <a:t>Platform-managed concerns</a:t>
+            </a:r>
+            <a:r>
+              <a:rPr lang="en-US" b="0" dirty="0"/>
+              <a:t>:  Following 12-factor principles and beyond, modern solutions delegate infrastructure concerns to the platform.  Load balancing, service discovery, secret management, certificate rotation, and the like become declarative configurations rather than application code, allowing developers and AI/ML engineers to focus on business value.</a:t>
+            </a:r>
+          </a:p>
+          <a:p>
+            <a:endParaRPr lang="en-US" b="0" dirty="0"/>
+          </a:p>
+          <a:p>
+            <a:r>
+              <a:rPr lang="en-US" b="1" dirty="0"/>
+              <a:t>Cost-optimized</a:t>
+            </a:r>
+            <a:r>
+              <a:rPr lang="en-US" b="0" dirty="0"/>
+              <a:t>:  With cloud spend often representing significant operational expense, solutions should try to implement intelligent resource allocation, spot instance usage, serverless where appropriate, and continuous cost monitoring with automated optimization.  All of this is, of course, both free and effortless.</a:t>
+            </a:r>
+          </a:p>
+          <a:p>
+            <a:endParaRPr lang="en-US" b="0" dirty="0"/>
+          </a:p>
+          <a:p>
+            <a:r>
+              <a:rPr lang="en-US" b="1" dirty="0"/>
+              <a:t>Operational excellence</a:t>
+            </a:r>
+            <a:r>
+              <a:rPr lang="en-US" b="0" dirty="0"/>
+              <a:t>:  Beyond traditional operations, this encompasses GitOps and DevSecOps workflows, automated disaster recovery, self-healing systems, and chaos engineering.  And who doesn’t want to play with something called “Chaos Monkey?”  The system itself becomes responsible for maintaining its operational health, with human operators setting policies rather than executing procedures.</a:t>
+            </a:r>
+          </a:p>
+          <a:p>
+            <a:endParaRPr lang="en-US" b="0" dirty="0"/>
+          </a:p>
+          <a:p>
+            <a:r>
+              <a:rPr lang="en-US" b="1" dirty="0"/>
+              <a:t>Multi-layer resilience</a:t>
+            </a:r>
+            <a:r>
+              <a:rPr lang="en-US" b="0" dirty="0"/>
+              <a:t>:  Resilience should be considered at every layer – from redundant infrastructure to circuit breakers in code to automated failover strategies.  Each layer isolates failures from propagating, creating defense in depth that goes beyond simple high-availability.</a:t>
+            </a:r>
+          </a:p>
+          <a:p>
+            <a:endParaRPr lang="en-US" b="0" dirty="0"/>
+          </a:p>
+          <a:p>
+            <a:r>
+              <a:rPr lang="en-US" b="1" dirty="0"/>
+              <a:t>Policy-driven governance</a:t>
+            </a:r>
+            <a:r>
+              <a:rPr lang="en-US" b="0" dirty="0"/>
+              <a:t>:  Security, compliance, and cost controls can be expressed as policies that the system enforces automatically.  To name a few examples, this includes network security groups, data classification and access rules, budget alerts, license compliance and vulnerability scanning for dependencies, runtime process protection, and on the list goes.  The point here is to organize governance concerns into manageable, auditable components so we can isolate solution developers from having to spend time on them.</a:t>
+            </a:r>
+          </a:p>
+          <a:p>
+            <a:endParaRPr lang="en-US" b="0" dirty="0"/>
+          </a:p>
+          <a:p>
+            <a:r>
+              <a:rPr lang="en-US" b="1" dirty="0"/>
+              <a:t>Unified observability</a:t>
+            </a:r>
+            <a:r>
+              <a:rPr lang="en-US" b="0" dirty="0"/>
+              <a:t>:  The system should provide comprehensive visibility across all layers such as infrastructure and cost metrics, application traces, saga status of business transactions, and business KPIs.  Provide a single pane of glass for understanding system behavior.  This organization of monitoring data enables teams to quickly isolate issues in complex distributed systems.</a:t>
+            </a:r>
+          </a:p>
+          <a:p>
+            <a:endParaRPr lang="en-US" b="0" dirty="0"/>
+          </a:p>
+          <a:p>
+            <a:r>
+              <a:rPr lang="en-US" b="1" dirty="0"/>
+              <a:t>Infrastructure (and other things) as code</a:t>
+            </a:r>
+            <a:r>
+              <a:rPr lang="en-US" b="0" dirty="0"/>
+              <a:t>:  All system components – networks, storage, security policies, compliance rules, and orchestration of executing workloads, are defined as versioned, testable code.  This transforms infrastructure from a collection of manual configurations into an organized, repeatable solution that can be systematically validated and evolve.</a:t>
+            </a:r>
+          </a:p>
+          <a:p>
+            <a:endParaRPr lang="en-US" b="0" dirty="0"/>
+          </a:p>
+          <a:p>
+            <a:r>
+              <a:rPr lang="en-US" b="1" dirty="0"/>
+              <a:t>Composable architecture</a:t>
+            </a:r>
+            <a:r>
+              <a:rPr lang="en-US" b="0" dirty="0"/>
+              <a:t>:  Systems are organized as loosely coupled, independently deployable components that communicate through well-defined contracts.  This includes not just microservices, but data pipelines, ML models, and infrastructure modules that can keep clear boundaries as they are composed into larger solutions.</a:t>
+            </a:r>
+          </a:p>
+          <a:p>
+            <a:endParaRPr lang="en-US" b="0" dirty="0"/>
+          </a:p>
+          <a:p>
+            <a:r>
+              <a:rPr lang="en-US" b="1" dirty="0"/>
+              <a:t>Event-driven</a:t>
+            </a:r>
+            <a:r>
+              <a:rPr lang="en-US" b="0" dirty="0"/>
+              <a:t>:  Modern architectures leverage event streaming, message queues, and reactive patterns to handle massive scale and provide near-realtime capabilities.  This enable loose coupling between services and supports both synchronous and asynchronous </a:t>
+            </a:r>
+            <a:r>
+              <a:rPr lang="en-US" b="0"/>
+              <a:t>processing patterns.</a:t>
+            </a:r>
+            <a:endParaRPr lang="en-US" b="1" dirty="0"/>
+          </a:p>
+        </p:txBody>
+      </p:sp>
+      <p:sp>
+        <p:nvSpPr>
+          <p:cNvPr id="4" name="Slide Number Placeholder 3"/>
+          <p:cNvSpPr>
+            <a:spLocks noGrp="1"/>
+          </p:cNvSpPr>
+          <p:nvPr>
+            <p:ph type="sldNum" sz="quarter" idx="5"/>
+          </p:nvPr>
+        </p:nvSpPr>
+        <p:spPr/>
+        <p:txBody>
+          <a:bodyPr/>
+          <a:lstStyle/>
+          <a:p>
+            <a:fld id="{555DAA9F-71E8-4E26-92D2-CD7FC535A9E6}" type="slidenum">
+              <a:rPr lang="en-US" smtClean="0"/>
+              <a:t>15</a:t>
+            </a:fld>
+            <a:endParaRPr lang="en-US"/>
+          </a:p>
+        </p:txBody>
+      </p:sp>
+    </p:spTree>
+    <p:extLst>
+      <p:ext uri="{BB962C8B-B14F-4D97-AF65-F5344CB8AC3E}">
+        <p14:creationId xmlns:p14="http://schemas.microsoft.com/office/powerpoint/2010/main" val="4186550098"/>
       </p:ext>
     </p:extLst>
   </p:cSld>
@@ -5016,7 +5326,7 @@
           <a:p>
             <a:r>
               <a:rPr lang="en-US" dirty="0"/>
-              <a:t>Applicability</a:t>
+              <a:t>Applicability (1)</a:t>
             </a:r>
           </a:p>
           <a:p>
@@ -5138,7 +5448,7 @@
           <a:p>
             <a:r>
               <a:rPr lang="en-US" dirty="0"/>
-              <a:t>What is “Enterprise Grade”</a:t>
+              <a:t>What Does Enterprise Grade Mean Today?</a:t>
             </a:r>
           </a:p>
         </p:txBody>
@@ -5164,7 +5474,47 @@
           <a:bodyPr/>
           <a:lstStyle/>
           <a:p>
-            <a:endParaRPr lang="en-US"/>
+            <a:r>
+              <a:rPr lang="en-US" dirty="0"/>
+              <a:t>Fit for purpose</a:t>
+            </a:r>
+          </a:p>
+          <a:p>
+            <a:r>
+              <a:rPr lang="en-US" dirty="0"/>
+              <a:t>Security by design</a:t>
+            </a:r>
+            <a:br>
+              <a:rPr lang="en-US" dirty="0"/>
+            </a:br>
+            <a:r>
+              <a:rPr lang="en-US" dirty="0"/>
+              <a:t>(When in doubt, start here)</a:t>
+            </a:r>
+          </a:p>
+          <a:p>
+            <a:r>
+              <a:rPr lang="en-US" dirty="0"/>
+              <a:t>Organized design</a:t>
+            </a:r>
+          </a:p>
+          <a:p>
+            <a:r>
+              <a:rPr lang="en-US" dirty="0"/>
+              <a:t>Isolation of complexity</a:t>
+            </a:r>
+          </a:p>
+          <a:p>
+            <a:r>
+              <a:rPr lang="en-US" dirty="0"/>
+              <a:t>Platform-managed concerns</a:t>
+            </a:r>
+          </a:p>
+          <a:p>
+            <a:r>
+              <a:rPr lang="en-US" dirty="0"/>
+              <a:t>Cost-optimized</a:t>
+            </a:r>
           </a:p>
         </p:txBody>
       </p:sp>
@@ -5189,7 +5539,52 @@
           <a:bodyPr/>
           <a:lstStyle/>
           <a:p>
-            <a:endParaRPr lang="en-US"/>
+            <a:r>
+              <a:rPr lang="en-US" dirty="0"/>
+              <a:t>Operational excellence</a:t>
+            </a:r>
+          </a:p>
+          <a:p>
+            <a:r>
+              <a:rPr lang="en-US" dirty="0"/>
+              <a:t>Multi-layer resilience</a:t>
+            </a:r>
+          </a:p>
+          <a:p>
+            <a:r>
+              <a:rPr lang="en-US" dirty="0"/>
+              <a:t>Policy-driven governance</a:t>
+            </a:r>
+          </a:p>
+          <a:p>
+            <a:r>
+              <a:rPr lang="en-US" dirty="0"/>
+              <a:t>Unified observability</a:t>
+            </a:r>
+          </a:p>
+          <a:p>
+            <a:r>
+              <a:rPr lang="en-US" dirty="0"/>
+              <a:t>Infrastructure as code</a:t>
+            </a:r>
+          </a:p>
+          <a:p>
+            <a:r>
+              <a:rPr lang="en-US" dirty="0"/>
+              <a:t>Composable architecture</a:t>
+            </a:r>
+          </a:p>
+          <a:p>
+            <a:r>
+              <a:rPr lang="en-US" dirty="0"/>
+              <a:t>Event-driven</a:t>
+            </a:r>
+          </a:p>
+          <a:p>
+            <a:endParaRPr lang="en-US" dirty="0"/>
+          </a:p>
+          <a:p>
+            <a:endParaRPr lang="en-US" dirty="0"/>
           </a:p>
         </p:txBody>
       </p:sp>
@@ -6190,15 +6585,7 @@
             <a:pPr lvl="1"/>
             <a:r>
               <a:rPr lang="en-US" dirty="0"/>
-              <a:t>DevOps/</a:t>
-            </a:r>
-            <a:r>
-              <a:rPr lang="en-US" dirty="0" err="1"/>
-              <a:t>DevSecOps</a:t>
-            </a:r>
-            <a:r>
-              <a:rPr lang="en-US" dirty="0"/>
-              <a:t>/</a:t>
+              <a:t>DevOps/DevSecOps/</a:t>
             </a:r>
             <a:r>
               <a:rPr lang="en-US" dirty="0" err="1"/>

</xml_diff>